<commit_message>
-WIP: add training instructions change 'task' to 'topic' update training slides update README update training instructions
</commit_message>
<xml_diff>
--- a/f5-opensource-docs-training.pptx
+++ b/f5-opensource-docs-training.pptx
@@ -5,7 +5,7 @@
     <p:sldMasterId id="2147483660" r:id="rId1"/>
   </p:sldMasterIdLst>
   <p:notesMasterIdLst>
-    <p:notesMasterId r:id="rId13"/>
+    <p:notesMasterId r:id="rId14"/>
   </p:notesMasterIdLst>
   <p:sldIdLst>
     <p:sldId id="256" r:id="rId2"/>
@@ -17,8 +17,9 @@
     <p:sldId id="269" r:id="rId8"/>
     <p:sldId id="265" r:id="rId9"/>
     <p:sldId id="266" r:id="rId10"/>
-    <p:sldId id="267" r:id="rId11"/>
-    <p:sldId id="270" r:id="rId12"/>
+    <p:sldId id="271" r:id="rId11"/>
+    <p:sldId id="267" r:id="rId12"/>
+    <p:sldId id="270" r:id="rId13"/>
   </p:sldIdLst>
   <p:sldSz cx="9144000" cy="5143500" type="screen16x9"/>
   <p:notesSz cx="6858000" cy="9144000"/>
@@ -139,6 +140,7 @@
             <p14:sldId id="269"/>
             <p14:sldId id="265"/>
             <p14:sldId id="266"/>
+            <p14:sldId id="271"/>
           </p14:sldIdLst>
         </p14:section>
         <p14:section name="Training Exercise" id="{91ECA7C1-9BB8-EB40-AA39-4C70A9EAA64A}">
@@ -9442,6 +9444,2284 @@
       </p:grpSpPr>
       <p:sp>
         <p:nvSpPr>
+          <p:cNvPr id="2" name="Title 1"/>
+          <p:cNvSpPr>
+            <a:spLocks noGrp="1"/>
+          </p:cNvSpPr>
+          <p:nvPr>
+            <p:ph type="title"/>
+          </p:nvPr>
+        </p:nvSpPr>
+        <p:spPr/>
+        <p:txBody>
+          <a:bodyPr/>
+          <a:lstStyle/>
+          <a:p>
+            <a:r>
+              <a:rPr lang="en-US" dirty="0" smtClean="0"/>
+              <a:t>Tying It All Together</a:t>
+            </a:r>
+            <a:endParaRPr lang="en-US" dirty="0"/>
+          </a:p>
+        </p:txBody>
+      </p:sp>
+      <p:sp>
+        <p:nvSpPr>
+          <p:cNvPr id="3" name="TextBox 2"/>
+          <p:cNvSpPr txBox="1"/>
+          <p:nvPr/>
+        </p:nvSpPr>
+        <p:spPr>
+          <a:xfrm>
+            <a:off x="548783" y="956616"/>
+            <a:ext cx="2217181" cy="3713373"/>
+          </a:xfrm>
+          <a:prstGeom prst="rect">
+            <a:avLst/>
+          </a:prstGeom>
+          <a:solidFill>
+            <a:schemeClr val="bg1"/>
+          </a:solidFill>
+          <a:ln>
+            <a:solidFill>
+              <a:schemeClr val="tx1">
+                <a:lumMod val="50000"/>
+                <a:lumOff val="50000"/>
+              </a:schemeClr>
+            </a:solidFill>
+          </a:ln>
+          <a:effectLst>
+            <a:outerShdw blurRad="50800" dist="38100" dir="8100000" algn="tr" rotWithShape="0">
+              <a:prstClr val="black">
+                <a:alpha val="40000"/>
+              </a:prstClr>
+            </a:outerShdw>
+          </a:effectLst>
+        </p:spPr>
+        <p:txBody>
+          <a:bodyPr wrap="square" lIns="0" tIns="0" rIns="0" bIns="0" rtlCol="0">
+            <a:normAutofit fontScale="92500" lnSpcReduction="10000"/>
+          </a:bodyPr>
+          <a:lstStyle/>
+          <a:p>
+            <a:pPr marL="230188"/>
+            <a:r>
+              <a:rPr lang="en-US" sz="800" dirty="0">
+                <a:solidFill>
+                  <a:schemeClr val="tx2"/>
+                </a:solidFill>
+                <a:effectLst>
+                  <a:outerShdw blurRad="38100" dist="25400" dir="2700000" algn="tl">
+                    <a:srgbClr val="000000">
+                      <a:alpha val="0"/>
+                    </a:srgbClr>
+                  </a:outerShdw>
+                </a:effectLst>
+                <a:latin typeface="Consolas"/>
+                <a:cs typeface="Consolas"/>
+              </a:rPr>
+              <a:t>title</a:t>
+            </a:r>
+          </a:p>
+          <a:p>
+            <a:pPr marL="230188"/>
+            <a:r>
+              <a:rPr lang="en-US" sz="800" dirty="0">
+                <a:solidFill>
+                  <a:schemeClr val="tx2"/>
+                </a:solidFill>
+                <a:effectLst>
+                  <a:outerShdw blurRad="38100" dist="25400" dir="2700000" algn="tl">
+                    <a:srgbClr val="000000">
+                      <a:alpha val="0"/>
+                    </a:srgbClr>
+                  </a:outerShdw>
+                </a:effectLst>
+                <a:latin typeface="Consolas"/>
+                <a:cs typeface="Consolas"/>
+              </a:rPr>
+              <a:t>=====</a:t>
+            </a:r>
+          </a:p>
+          <a:p>
+            <a:pPr marL="230188"/>
+            <a:endParaRPr lang="en-US" sz="800" dirty="0">
+              <a:solidFill>
+                <a:schemeClr val="tx2"/>
+              </a:solidFill>
+              <a:effectLst>
+                <a:outerShdw blurRad="38100" dist="25400" dir="2700000" algn="tl">
+                  <a:srgbClr val="000000">
+                    <a:alpha val="0"/>
+                  </a:srgbClr>
+                </a:outerShdw>
+              </a:effectLst>
+              <a:latin typeface="Consolas"/>
+              <a:cs typeface="Consolas"/>
+            </a:endParaRPr>
+          </a:p>
+          <a:p>
+            <a:pPr marL="230188"/>
+            <a:r>
+              <a:rPr lang="en-US" sz="800" dirty="0">
+                <a:solidFill>
+                  <a:schemeClr val="tx2"/>
+                </a:solidFill>
+                <a:effectLst>
+                  <a:outerShdw blurRad="38100" dist="25400" dir="2700000" algn="tl">
+                    <a:srgbClr val="000000">
+                      <a:alpha val="0"/>
+                    </a:srgbClr>
+                  </a:outerShdw>
+                </a:effectLst>
+                <a:latin typeface="Consolas"/>
+                <a:cs typeface="Consolas"/>
+              </a:rPr>
+              <a:t>Overview</a:t>
+            </a:r>
+          </a:p>
+          <a:p>
+            <a:pPr marL="230188"/>
+            <a:r>
+              <a:rPr lang="en-US" sz="800" dirty="0">
+                <a:solidFill>
+                  <a:schemeClr val="tx2"/>
+                </a:solidFill>
+                <a:effectLst>
+                  <a:outerShdw blurRad="38100" dist="25400" dir="2700000" algn="tl">
+                    <a:srgbClr val="000000">
+                      <a:alpha val="0"/>
+                    </a:srgbClr>
+                  </a:outerShdw>
+                </a:effectLst>
+                <a:latin typeface="Consolas"/>
+                <a:cs typeface="Consolas"/>
+              </a:rPr>
+              <a:t>--------</a:t>
+            </a:r>
+          </a:p>
+          <a:p>
+            <a:pPr marL="230188"/>
+            <a:endParaRPr lang="en-US" sz="800" dirty="0">
+              <a:solidFill>
+                <a:schemeClr val="tx2"/>
+              </a:solidFill>
+              <a:effectLst>
+                <a:outerShdw blurRad="38100" dist="25400" dir="2700000" algn="tl">
+                  <a:srgbClr val="000000">
+                    <a:alpha val="0"/>
+                  </a:srgbClr>
+                </a:outerShdw>
+              </a:effectLst>
+              <a:latin typeface="Consolas"/>
+              <a:cs typeface="Consolas"/>
+            </a:endParaRPr>
+          </a:p>
+          <a:p>
+            <a:pPr marL="230188"/>
+            <a:r>
+              <a:rPr lang="en-US" sz="800" dirty="0">
+                <a:solidFill>
+                  <a:schemeClr val="tx2"/>
+                </a:solidFill>
+                <a:effectLst>
+                  <a:outerShdw blurRad="38100" dist="25400" dir="2700000" algn="tl">
+                    <a:srgbClr val="000000">
+                      <a:alpha val="0"/>
+                    </a:srgbClr>
+                  </a:outerShdw>
+                </a:effectLst>
+                <a:latin typeface="Consolas"/>
+                <a:cs typeface="Consolas"/>
+              </a:rPr>
+              <a:t>Use Case</a:t>
+            </a:r>
+          </a:p>
+          <a:p>
+            <a:pPr marL="230188"/>
+            <a:r>
+              <a:rPr lang="en-US" sz="800" dirty="0">
+                <a:solidFill>
+                  <a:schemeClr val="tx2"/>
+                </a:solidFill>
+                <a:effectLst>
+                  <a:outerShdw blurRad="38100" dist="25400" dir="2700000" algn="tl">
+                    <a:srgbClr val="000000">
+                      <a:alpha val="0"/>
+                    </a:srgbClr>
+                  </a:outerShdw>
+                </a:effectLst>
+                <a:latin typeface="Consolas"/>
+                <a:cs typeface="Consolas"/>
+              </a:rPr>
+              <a:t>--------</a:t>
+            </a:r>
+          </a:p>
+          <a:p>
+            <a:pPr marL="230188"/>
+            <a:endParaRPr lang="en-US" sz="800" dirty="0">
+              <a:solidFill>
+                <a:schemeClr val="tx2"/>
+              </a:solidFill>
+              <a:effectLst>
+                <a:outerShdw blurRad="38100" dist="25400" dir="2700000" algn="tl">
+                  <a:srgbClr val="000000">
+                    <a:alpha val="0"/>
+                  </a:srgbClr>
+                </a:outerShdw>
+              </a:effectLst>
+              <a:latin typeface="Consolas"/>
+              <a:cs typeface="Consolas"/>
+            </a:endParaRPr>
+          </a:p>
+          <a:p>
+            <a:pPr marL="230188"/>
+            <a:r>
+              <a:rPr lang="en-US" sz="800" dirty="0">
+                <a:solidFill>
+                  <a:schemeClr val="tx2"/>
+                </a:solidFill>
+                <a:effectLst>
+                  <a:outerShdw blurRad="38100" dist="25400" dir="2700000" algn="tl">
+                    <a:srgbClr val="000000">
+                      <a:alpha val="0"/>
+                    </a:srgbClr>
+                  </a:outerShdw>
+                </a:effectLst>
+                <a:latin typeface="Consolas"/>
+                <a:cs typeface="Consolas"/>
+              </a:rPr>
+              <a:t>Prerequisites</a:t>
+            </a:r>
+          </a:p>
+          <a:p>
+            <a:pPr marL="230188"/>
+            <a:r>
+              <a:rPr lang="en-US" sz="800" dirty="0">
+                <a:solidFill>
+                  <a:schemeClr val="tx2"/>
+                </a:solidFill>
+                <a:effectLst>
+                  <a:outerShdw blurRad="38100" dist="25400" dir="2700000" algn="tl">
+                    <a:srgbClr val="000000">
+                      <a:alpha val="0"/>
+                    </a:srgbClr>
+                  </a:outerShdw>
+                </a:effectLst>
+                <a:latin typeface="Consolas"/>
+                <a:cs typeface="Consolas"/>
+              </a:rPr>
+              <a:t>-------------</a:t>
+            </a:r>
+          </a:p>
+          <a:p>
+            <a:pPr marL="230188"/>
+            <a:r>
+              <a:rPr lang="en-US" sz="800" dirty="0" smtClean="0">
+                <a:solidFill>
+                  <a:schemeClr val="tx2"/>
+                </a:solidFill>
+                <a:effectLst>
+                  <a:outerShdw blurRad="38100" dist="25400" dir="2700000" algn="tl">
+                    <a:srgbClr val="000000">
+                      <a:alpha val="0"/>
+                    </a:srgbClr>
+                  </a:outerShdw>
+                </a:effectLst>
+                <a:latin typeface="Consolas"/>
+                <a:cs typeface="Consolas"/>
+              </a:rPr>
+              <a:t>-</a:t>
+            </a:r>
+            <a:endParaRPr lang="en-US" sz="800" dirty="0">
+              <a:solidFill>
+                <a:schemeClr val="tx2"/>
+              </a:solidFill>
+              <a:effectLst>
+                <a:outerShdw blurRad="38100" dist="25400" dir="2700000" algn="tl">
+                  <a:srgbClr val="000000">
+                    <a:alpha val="0"/>
+                  </a:srgbClr>
+                </a:outerShdw>
+              </a:effectLst>
+              <a:latin typeface="Consolas"/>
+              <a:cs typeface="Consolas"/>
+            </a:endParaRPr>
+          </a:p>
+          <a:p>
+            <a:pPr marL="230188"/>
+            <a:r>
+              <a:rPr lang="en-US" sz="800" dirty="0">
+                <a:solidFill>
+                  <a:schemeClr val="tx2"/>
+                </a:solidFill>
+                <a:effectLst>
+                  <a:outerShdw blurRad="38100" dist="25400" dir="2700000" algn="tl">
+                    <a:srgbClr val="000000">
+                      <a:alpha val="0"/>
+                    </a:srgbClr>
+                  </a:outerShdw>
+                </a:effectLst>
+                <a:latin typeface="Consolas"/>
+                <a:cs typeface="Consolas"/>
+              </a:rPr>
+              <a:t>-</a:t>
+            </a:r>
+          </a:p>
+          <a:p>
+            <a:pPr marL="230188"/>
+            <a:r>
+              <a:rPr lang="en-US" sz="800" dirty="0">
+                <a:solidFill>
+                  <a:schemeClr val="tx2"/>
+                </a:solidFill>
+                <a:effectLst>
+                  <a:outerShdw blurRad="38100" dist="25400" dir="2700000" algn="tl">
+                    <a:srgbClr val="000000">
+                      <a:alpha val="0"/>
+                    </a:srgbClr>
+                  </a:outerShdw>
+                </a:effectLst>
+                <a:latin typeface="Consolas"/>
+                <a:cs typeface="Consolas"/>
+              </a:rPr>
+              <a:t>-</a:t>
+            </a:r>
+          </a:p>
+          <a:p>
+            <a:pPr marL="230188"/>
+            <a:endParaRPr lang="en-US" sz="800" dirty="0">
+              <a:solidFill>
+                <a:schemeClr val="tx2"/>
+              </a:solidFill>
+              <a:effectLst>
+                <a:outerShdw blurRad="38100" dist="25400" dir="2700000" algn="tl">
+                  <a:srgbClr val="000000">
+                    <a:alpha val="0"/>
+                  </a:srgbClr>
+                </a:outerShdw>
+              </a:effectLst>
+              <a:latin typeface="Consolas"/>
+              <a:cs typeface="Consolas"/>
+            </a:endParaRPr>
+          </a:p>
+          <a:p>
+            <a:pPr marL="230188"/>
+            <a:endParaRPr lang="en-US" sz="800" dirty="0">
+              <a:solidFill>
+                <a:schemeClr val="tx2"/>
+              </a:solidFill>
+              <a:effectLst>
+                <a:outerShdw blurRad="38100" dist="25400" dir="2700000" algn="tl">
+                  <a:srgbClr val="000000">
+                    <a:alpha val="0"/>
+                  </a:srgbClr>
+                </a:outerShdw>
+              </a:effectLst>
+              <a:latin typeface="Consolas"/>
+              <a:cs typeface="Consolas"/>
+            </a:endParaRPr>
+          </a:p>
+          <a:p>
+            <a:pPr marL="230188"/>
+            <a:r>
+              <a:rPr lang="en-US" sz="800" dirty="0">
+                <a:solidFill>
+                  <a:schemeClr val="tx2"/>
+                </a:solidFill>
+                <a:effectLst>
+                  <a:outerShdw blurRad="38100" dist="25400" dir="2700000" algn="tl">
+                    <a:srgbClr val="000000">
+                      <a:alpha val="0"/>
+                    </a:srgbClr>
+                  </a:outerShdw>
+                </a:effectLst>
+                <a:latin typeface="Consolas"/>
+                <a:cs typeface="Consolas"/>
+              </a:rPr>
+              <a:t>Caveats</a:t>
+            </a:r>
+          </a:p>
+          <a:p>
+            <a:pPr marL="230188"/>
+            <a:r>
+              <a:rPr lang="en-US" sz="800" dirty="0">
+                <a:solidFill>
+                  <a:schemeClr val="tx2"/>
+                </a:solidFill>
+                <a:effectLst>
+                  <a:outerShdw blurRad="38100" dist="25400" dir="2700000" algn="tl">
+                    <a:srgbClr val="000000">
+                      <a:alpha val="0"/>
+                    </a:srgbClr>
+                  </a:outerShdw>
+                </a:effectLst>
+                <a:latin typeface="Consolas"/>
+                <a:cs typeface="Consolas"/>
+              </a:rPr>
+              <a:t>-------</a:t>
+            </a:r>
+          </a:p>
+          <a:p>
+            <a:pPr marL="230188"/>
+            <a:endParaRPr lang="en-US" sz="800" dirty="0">
+              <a:solidFill>
+                <a:schemeClr val="tx2"/>
+              </a:solidFill>
+              <a:effectLst>
+                <a:outerShdw blurRad="38100" dist="25400" dir="2700000" algn="tl">
+                  <a:srgbClr val="000000">
+                    <a:alpha val="0"/>
+                  </a:srgbClr>
+                </a:outerShdw>
+              </a:effectLst>
+              <a:latin typeface="Consolas"/>
+              <a:cs typeface="Consolas"/>
+            </a:endParaRPr>
+          </a:p>
+          <a:p>
+            <a:pPr marL="230188"/>
+            <a:r>
+              <a:rPr lang="en-US" sz="800" dirty="0">
+                <a:solidFill>
+                  <a:schemeClr val="tx2"/>
+                </a:solidFill>
+                <a:effectLst>
+                  <a:outerShdw blurRad="38100" dist="25400" dir="2700000" algn="tl">
+                    <a:srgbClr val="000000">
+                      <a:alpha val="0"/>
+                    </a:srgbClr>
+                  </a:outerShdw>
+                </a:effectLst>
+                <a:latin typeface="Consolas"/>
+                <a:cs typeface="Consolas"/>
+              </a:rPr>
+              <a:t>-</a:t>
+            </a:r>
+          </a:p>
+          <a:p>
+            <a:pPr marL="230188"/>
+            <a:r>
+              <a:rPr lang="en-US" sz="800" dirty="0">
+                <a:solidFill>
+                  <a:schemeClr val="tx2"/>
+                </a:solidFill>
+                <a:effectLst>
+                  <a:outerShdw blurRad="38100" dist="25400" dir="2700000" algn="tl">
+                    <a:srgbClr val="000000">
+                      <a:alpha val="0"/>
+                    </a:srgbClr>
+                  </a:outerShdw>
+                </a:effectLst>
+                <a:latin typeface="Consolas"/>
+                <a:cs typeface="Consolas"/>
+              </a:rPr>
+              <a:t>-</a:t>
+            </a:r>
+          </a:p>
+          <a:p>
+            <a:pPr marL="230188"/>
+            <a:r>
+              <a:rPr lang="en-US" sz="800" dirty="0">
+                <a:solidFill>
+                  <a:schemeClr val="tx2"/>
+                </a:solidFill>
+                <a:effectLst>
+                  <a:outerShdw blurRad="38100" dist="25400" dir="2700000" algn="tl">
+                    <a:srgbClr val="000000">
+                      <a:alpha val="0"/>
+                    </a:srgbClr>
+                  </a:outerShdw>
+                </a:effectLst>
+                <a:latin typeface="Consolas"/>
+                <a:cs typeface="Consolas"/>
+              </a:rPr>
+              <a:t>-</a:t>
+            </a:r>
+          </a:p>
+          <a:p>
+            <a:pPr marL="230188"/>
+            <a:endParaRPr lang="en-US" sz="800" dirty="0">
+              <a:solidFill>
+                <a:schemeClr val="tx2"/>
+              </a:solidFill>
+              <a:effectLst>
+                <a:outerShdw blurRad="38100" dist="25400" dir="2700000" algn="tl">
+                  <a:srgbClr val="000000">
+                    <a:alpha val="0"/>
+                  </a:srgbClr>
+                </a:outerShdw>
+              </a:effectLst>
+              <a:latin typeface="Consolas"/>
+              <a:cs typeface="Consolas"/>
+            </a:endParaRPr>
+          </a:p>
+          <a:p>
+            <a:pPr marL="230188"/>
+            <a:endParaRPr lang="en-US" sz="800" dirty="0">
+              <a:solidFill>
+                <a:schemeClr val="tx2"/>
+              </a:solidFill>
+              <a:effectLst>
+                <a:outerShdw blurRad="38100" dist="25400" dir="2700000" algn="tl">
+                  <a:srgbClr val="000000">
+                    <a:alpha val="0"/>
+                  </a:srgbClr>
+                </a:outerShdw>
+              </a:effectLst>
+              <a:latin typeface="Consolas"/>
+              <a:cs typeface="Consolas"/>
+            </a:endParaRPr>
+          </a:p>
+          <a:p>
+            <a:pPr marL="230188"/>
+            <a:r>
+              <a:rPr lang="en-US" sz="800" dirty="0">
+                <a:solidFill>
+                  <a:schemeClr val="tx2"/>
+                </a:solidFill>
+                <a:effectLst>
+                  <a:outerShdw blurRad="38100" dist="25400" dir="2700000" algn="tl">
+                    <a:srgbClr val="000000">
+                      <a:alpha val="0"/>
+                    </a:srgbClr>
+                  </a:outerShdw>
+                </a:effectLst>
+                <a:latin typeface="Consolas"/>
+                <a:cs typeface="Consolas"/>
+              </a:rPr>
+              <a:t>Configuration</a:t>
+            </a:r>
+          </a:p>
+          <a:p>
+            <a:pPr marL="230188"/>
+            <a:r>
+              <a:rPr lang="en-US" sz="800" dirty="0">
+                <a:solidFill>
+                  <a:schemeClr val="tx2"/>
+                </a:solidFill>
+                <a:effectLst>
+                  <a:outerShdw blurRad="38100" dist="25400" dir="2700000" algn="tl">
+                    <a:srgbClr val="000000">
+                      <a:alpha val="0"/>
+                    </a:srgbClr>
+                  </a:outerShdw>
+                </a:effectLst>
+                <a:latin typeface="Consolas"/>
+                <a:cs typeface="Consolas"/>
+              </a:rPr>
+              <a:t>-------------</a:t>
+            </a:r>
+          </a:p>
+          <a:p>
+            <a:pPr marL="230188"/>
+            <a:endParaRPr lang="en-US" sz="800" dirty="0">
+              <a:solidFill>
+                <a:schemeClr val="tx2"/>
+              </a:solidFill>
+              <a:effectLst>
+                <a:outerShdw blurRad="38100" dist="25400" dir="2700000" algn="tl">
+                  <a:srgbClr val="000000">
+                    <a:alpha val="0"/>
+                  </a:srgbClr>
+                </a:outerShdw>
+              </a:effectLst>
+              <a:latin typeface="Consolas"/>
+              <a:cs typeface="Consolas"/>
+            </a:endParaRPr>
+          </a:p>
+          <a:p>
+            <a:pPr marL="230188"/>
+            <a:endParaRPr lang="en-US" sz="800" dirty="0">
+              <a:solidFill>
+                <a:schemeClr val="tx2"/>
+              </a:solidFill>
+              <a:effectLst>
+                <a:outerShdw blurRad="38100" dist="25400" dir="2700000" algn="tl">
+                  <a:srgbClr val="000000">
+                    <a:alpha val="0"/>
+                  </a:srgbClr>
+                </a:outerShdw>
+              </a:effectLst>
+              <a:latin typeface="Consolas"/>
+              <a:cs typeface="Consolas"/>
+            </a:endParaRPr>
+          </a:p>
+          <a:p>
+            <a:pPr marL="230188"/>
+            <a:r>
+              <a:rPr lang="en-US" sz="800" dirty="0">
+                <a:solidFill>
+                  <a:schemeClr val="tx2"/>
+                </a:solidFill>
+                <a:effectLst>
+                  <a:outerShdw blurRad="38100" dist="25400" dir="2700000" algn="tl">
+                    <a:srgbClr val="000000">
+                      <a:alpha val="0"/>
+                    </a:srgbClr>
+                  </a:outerShdw>
+                </a:effectLst>
+                <a:latin typeface="Consolas"/>
+                <a:cs typeface="Consolas"/>
+              </a:rPr>
+              <a:t>Further Reading</a:t>
+            </a:r>
+          </a:p>
+          <a:p>
+            <a:pPr marL="230188"/>
+            <a:r>
+              <a:rPr lang="en-US" sz="800" dirty="0">
+                <a:solidFill>
+                  <a:schemeClr val="tx2"/>
+                </a:solidFill>
+                <a:effectLst>
+                  <a:outerShdw blurRad="38100" dist="25400" dir="2700000" algn="tl">
+                    <a:srgbClr val="000000">
+                      <a:alpha val="0"/>
+                    </a:srgbClr>
+                  </a:outerShdw>
+                </a:effectLst>
+                <a:latin typeface="Consolas"/>
+                <a:cs typeface="Consolas"/>
+              </a:rPr>
+              <a:t>---------------</a:t>
+            </a:r>
+          </a:p>
+          <a:p>
+            <a:pPr marL="230188"/>
+            <a:endParaRPr lang="en-US" sz="800" dirty="0">
+              <a:solidFill>
+                <a:schemeClr val="tx2"/>
+              </a:solidFill>
+              <a:effectLst>
+                <a:outerShdw blurRad="38100" dist="25400" dir="2700000" algn="tl">
+                  <a:srgbClr val="000000">
+                    <a:alpha val="0"/>
+                  </a:srgbClr>
+                </a:outerShdw>
+              </a:effectLst>
+              <a:latin typeface="Consolas"/>
+              <a:cs typeface="Consolas"/>
+            </a:endParaRPr>
+          </a:p>
+          <a:p>
+            <a:pPr marL="230188"/>
+            <a:r>
+              <a:rPr lang="en-US" sz="800" dirty="0">
+                <a:solidFill>
+                  <a:schemeClr val="tx2"/>
+                </a:solidFill>
+                <a:effectLst>
+                  <a:outerShdw blurRad="38100" dist="25400" dir="2700000" algn="tl">
+                    <a:srgbClr val="000000">
+                      <a:alpha val="0"/>
+                    </a:srgbClr>
+                  </a:outerShdw>
+                </a:effectLst>
+                <a:latin typeface="Consolas"/>
+                <a:cs typeface="Consolas"/>
+              </a:rPr>
+              <a:t>.. </a:t>
+            </a:r>
+            <a:r>
+              <a:rPr lang="en-US" sz="800" dirty="0" err="1">
+                <a:solidFill>
+                  <a:schemeClr val="tx2"/>
+                </a:solidFill>
+                <a:effectLst>
+                  <a:outerShdw blurRad="38100" dist="25400" dir="2700000" algn="tl">
+                    <a:srgbClr val="000000">
+                      <a:alpha val="0"/>
+                    </a:srgbClr>
+                  </a:outerShdw>
+                </a:effectLst>
+                <a:latin typeface="Consolas"/>
+                <a:cs typeface="Consolas"/>
+              </a:rPr>
+              <a:t>seealso</a:t>
+            </a:r>
+            <a:r>
+              <a:rPr lang="en-US" sz="800" dirty="0">
+                <a:solidFill>
+                  <a:schemeClr val="tx2"/>
+                </a:solidFill>
+                <a:effectLst>
+                  <a:outerShdw blurRad="38100" dist="25400" dir="2700000" algn="tl">
+                    <a:srgbClr val="000000">
+                      <a:alpha val="0"/>
+                    </a:srgbClr>
+                  </a:outerShdw>
+                </a:effectLst>
+                <a:latin typeface="Consolas"/>
+                <a:cs typeface="Consolas"/>
+              </a:rPr>
+              <a:t>::</a:t>
+            </a:r>
+          </a:p>
+          <a:p>
+            <a:pPr marL="230188"/>
+            <a:endParaRPr lang="en-US" sz="800" dirty="0">
+              <a:solidFill>
+                <a:schemeClr val="tx2"/>
+              </a:solidFill>
+              <a:effectLst>
+                <a:outerShdw blurRad="38100" dist="25400" dir="2700000" algn="tl">
+                  <a:srgbClr val="000000">
+                    <a:alpha val="0"/>
+                  </a:srgbClr>
+                </a:outerShdw>
+              </a:effectLst>
+              <a:latin typeface="Consolas"/>
+              <a:cs typeface="Consolas"/>
+            </a:endParaRPr>
+          </a:p>
+          <a:p>
+            <a:pPr marL="230188"/>
+            <a:r>
+              <a:rPr lang="en-US" sz="800" dirty="0">
+                <a:solidFill>
+                  <a:schemeClr val="tx2"/>
+                </a:solidFill>
+                <a:effectLst>
+                  <a:outerShdw blurRad="38100" dist="25400" dir="2700000" algn="tl">
+                    <a:srgbClr val="000000">
+                      <a:alpha val="0"/>
+                    </a:srgbClr>
+                  </a:outerShdw>
+                </a:effectLst>
+                <a:latin typeface="Consolas"/>
+                <a:cs typeface="Consolas"/>
+              </a:rPr>
+              <a:t>    * x</a:t>
+            </a:r>
+          </a:p>
+          <a:p>
+            <a:pPr marL="230188"/>
+            <a:r>
+              <a:rPr lang="en-US" sz="800" dirty="0">
+                <a:solidFill>
+                  <a:schemeClr val="tx2"/>
+                </a:solidFill>
+                <a:effectLst>
+                  <a:outerShdw blurRad="38100" dist="25400" dir="2700000" algn="tl">
+                    <a:srgbClr val="000000">
+                      <a:alpha val="0"/>
+                    </a:srgbClr>
+                  </a:outerShdw>
+                </a:effectLst>
+                <a:latin typeface="Consolas"/>
+                <a:cs typeface="Consolas"/>
+              </a:rPr>
+              <a:t>    * y</a:t>
+            </a:r>
+          </a:p>
+          <a:p>
+            <a:pPr marL="230188"/>
+            <a:r>
+              <a:rPr lang="en-US" sz="800" dirty="0">
+                <a:solidFill>
+                  <a:schemeClr val="tx2"/>
+                </a:solidFill>
+                <a:effectLst>
+                  <a:outerShdw blurRad="38100" dist="25400" dir="2700000" algn="tl">
+                    <a:srgbClr val="000000">
+                      <a:alpha val="0"/>
+                    </a:srgbClr>
+                  </a:outerShdw>
+                </a:effectLst>
+                <a:latin typeface="Consolas"/>
+                <a:cs typeface="Consolas"/>
+              </a:rPr>
+              <a:t>    * z</a:t>
+            </a:r>
+          </a:p>
+        </p:txBody>
+      </p:sp>
+      <p:sp>
+        <p:nvSpPr>
+          <p:cNvPr id="4" name="Right Arrow 3"/>
+          <p:cNvSpPr/>
+          <p:nvPr/>
+        </p:nvSpPr>
+        <p:spPr>
+          <a:xfrm>
+            <a:off x="1739154" y="1323713"/>
+            <a:ext cx="1837831" cy="287093"/>
+          </a:xfrm>
+          <a:prstGeom prst="rightArrow">
+            <a:avLst/>
+          </a:prstGeom>
+          <a:solidFill>
+            <a:schemeClr val="accent1">
+              <a:lumMod val="75000"/>
+            </a:schemeClr>
+          </a:solidFill>
+        </p:spPr>
+        <p:txBody>
+          <a:bodyPr vert="horz" wrap="square" lIns="182880" tIns="0" rIns="91440" bIns="0" rtlCol="0" anchor="ctr">
+            <a:noAutofit/>
+          </a:bodyPr>
+          <a:lstStyle/>
+          <a:p>
+            <a:pPr indent="0" algn="ctr">
+              <a:lnSpc>
+                <a:spcPct val="90000"/>
+              </a:lnSpc>
+              <a:spcBef>
+                <a:spcPts val="0"/>
+              </a:spcBef>
+              <a:spcAft>
+                <a:spcPts val="0"/>
+              </a:spcAft>
+              <a:buClrTx/>
+              <a:buFont typeface="Arial" pitchFamily="34" charset="0"/>
+              <a:buNone/>
+            </a:pPr>
+            <a:endParaRPr lang="en-US" sz="2000" b="0" i="0" cap="all" baseline="0">
+              <a:solidFill>
+                <a:schemeClr val="bg1"/>
+              </a:solidFill>
+              <a:effectLst>
+                <a:outerShdw blurRad="38100" dist="25400" dir="2700000" algn="tl">
+                  <a:srgbClr val="000000">
+                    <a:alpha val="0"/>
+                  </a:srgbClr>
+                </a:outerShdw>
+              </a:effectLst>
+              <a:latin typeface="+mj-lt"/>
+            </a:endParaRPr>
+          </a:p>
+        </p:txBody>
+      </p:sp>
+      <p:sp>
+        <p:nvSpPr>
+          <p:cNvPr id="5" name="TextBox 4"/>
+          <p:cNvSpPr txBox="1"/>
+          <p:nvPr/>
+        </p:nvSpPr>
+        <p:spPr>
+          <a:xfrm>
+            <a:off x="3696320" y="1313849"/>
+            <a:ext cx="914400" cy="306820"/>
+          </a:xfrm>
+          <a:prstGeom prst="rect">
+            <a:avLst/>
+          </a:prstGeom>
+          <a:noFill/>
+        </p:spPr>
+        <p:txBody>
+          <a:bodyPr wrap="none" lIns="0" tIns="0" rIns="0" bIns="0" rtlCol="0">
+            <a:noAutofit/>
+          </a:bodyPr>
+          <a:lstStyle/>
+          <a:p>
+            <a:pPr>
+              <a:lnSpc>
+                <a:spcPct val="90000"/>
+              </a:lnSpc>
+              <a:spcAft>
+                <a:spcPts val="600"/>
+              </a:spcAft>
+            </a:pPr>
+            <a:r>
+              <a:rPr lang="en-US" sz="2000" b="1" kern="1200" dirty="0" smtClean="0">
+                <a:solidFill>
+                  <a:schemeClr val="tx2"/>
+                </a:solidFill>
+                <a:effectLst>
+                  <a:outerShdw blurRad="38100" dist="25400" dir="2700000" algn="tl">
+                    <a:srgbClr val="000000">
+                      <a:alpha val="0"/>
+                    </a:srgbClr>
+                  </a:outerShdw>
+                </a:effectLst>
+                <a:latin typeface="+mn-lt"/>
+                <a:ea typeface="+mn-ea"/>
+                <a:cs typeface="+mn-cs"/>
+              </a:rPr>
+              <a:t>concept</a:t>
+            </a:r>
+            <a:endParaRPr lang="en-US" sz="2000" b="1" kern="1200" dirty="0" smtClean="0">
+              <a:solidFill>
+                <a:schemeClr val="tx2"/>
+              </a:solidFill>
+              <a:effectLst>
+                <a:outerShdw blurRad="38100" dist="25400" dir="2700000" algn="tl">
+                  <a:srgbClr val="000000">
+                    <a:alpha val="0"/>
+                  </a:srgbClr>
+                </a:outerShdw>
+              </a:effectLst>
+              <a:latin typeface="+mn-lt"/>
+              <a:ea typeface="+mn-ea"/>
+              <a:cs typeface="+mn-cs"/>
+            </a:endParaRPr>
+          </a:p>
+        </p:txBody>
+      </p:sp>
+      <p:sp>
+        <p:nvSpPr>
+          <p:cNvPr id="8" name="Right Arrow 7"/>
+          <p:cNvSpPr/>
+          <p:nvPr/>
+        </p:nvSpPr>
+        <p:spPr>
+          <a:xfrm>
+            <a:off x="1739154" y="3223602"/>
+            <a:ext cx="1837831" cy="287093"/>
+          </a:xfrm>
+          <a:prstGeom prst="rightArrow">
+            <a:avLst/>
+          </a:prstGeom>
+          <a:solidFill>
+            <a:schemeClr val="accent1">
+              <a:lumMod val="75000"/>
+            </a:schemeClr>
+          </a:solidFill>
+        </p:spPr>
+        <p:txBody>
+          <a:bodyPr vert="horz" wrap="square" lIns="182880" tIns="0" rIns="91440" bIns="0" rtlCol="0" anchor="ctr">
+            <a:noAutofit/>
+          </a:bodyPr>
+          <a:lstStyle/>
+          <a:p>
+            <a:pPr indent="0" algn="ctr">
+              <a:lnSpc>
+                <a:spcPct val="90000"/>
+              </a:lnSpc>
+              <a:spcBef>
+                <a:spcPts val="0"/>
+              </a:spcBef>
+              <a:spcAft>
+                <a:spcPts val="0"/>
+              </a:spcAft>
+              <a:buClrTx/>
+              <a:buFont typeface="Arial" pitchFamily="34" charset="0"/>
+              <a:buNone/>
+            </a:pPr>
+            <a:endParaRPr lang="en-US" sz="2000" b="0" i="0" cap="all" baseline="0">
+              <a:solidFill>
+                <a:schemeClr val="bg1"/>
+              </a:solidFill>
+              <a:effectLst>
+                <a:outerShdw blurRad="38100" dist="25400" dir="2700000" algn="tl">
+                  <a:srgbClr val="000000">
+                    <a:alpha val="0"/>
+                  </a:srgbClr>
+                </a:outerShdw>
+              </a:effectLst>
+              <a:latin typeface="+mj-lt"/>
+            </a:endParaRPr>
+          </a:p>
+        </p:txBody>
+      </p:sp>
+      <p:sp>
+        <p:nvSpPr>
+          <p:cNvPr id="9" name="Rectangle 8"/>
+          <p:cNvSpPr/>
+          <p:nvPr/>
+        </p:nvSpPr>
+        <p:spPr>
+          <a:xfrm>
+            <a:off x="3696320" y="3240190"/>
+            <a:ext cx="471245" cy="253916"/>
+          </a:xfrm>
+          <a:prstGeom prst="rect">
+            <a:avLst/>
+          </a:prstGeom>
+        </p:spPr>
+        <p:txBody>
+          <a:bodyPr wrap="none" lIns="0" tIns="0" rIns="0" bIns="0">
+            <a:spAutoFit/>
+          </a:bodyPr>
+          <a:lstStyle/>
+          <a:p>
+            <a:pPr>
+              <a:lnSpc>
+                <a:spcPct val="90000"/>
+              </a:lnSpc>
+              <a:spcAft>
+                <a:spcPts val="600"/>
+              </a:spcAft>
+            </a:pPr>
+            <a:r>
+              <a:rPr lang="en-US" b="1" dirty="0" smtClean="0">
+                <a:solidFill>
+                  <a:schemeClr val="tx2"/>
+                </a:solidFill>
+                <a:effectLst>
+                  <a:outerShdw blurRad="38100" dist="25400" dir="2700000" algn="tl">
+                    <a:srgbClr val="000000">
+                      <a:alpha val="0"/>
+                    </a:srgbClr>
+                  </a:outerShdw>
+                </a:effectLst>
+              </a:rPr>
+              <a:t>topic</a:t>
+            </a:r>
+            <a:endParaRPr lang="en-US" b="1" dirty="0">
+              <a:solidFill>
+                <a:schemeClr val="tx2"/>
+              </a:solidFill>
+              <a:effectLst>
+                <a:outerShdw blurRad="38100" dist="25400" dir="2700000" algn="tl">
+                  <a:srgbClr val="000000">
+                    <a:alpha val="0"/>
+                  </a:srgbClr>
+                </a:outerShdw>
+              </a:effectLst>
+            </a:endParaRPr>
+          </a:p>
+        </p:txBody>
+      </p:sp>
+      <p:cxnSp>
+        <p:nvCxnSpPr>
+          <p:cNvPr id="13" name="Straight Connector 12"/>
+          <p:cNvCxnSpPr/>
+          <p:nvPr/>
+        </p:nvCxnSpPr>
+        <p:spPr>
+          <a:xfrm>
+            <a:off x="1227440" y="1214257"/>
+            <a:ext cx="392099" cy="0"/>
+          </a:xfrm>
+          <a:prstGeom prst="line">
+            <a:avLst/>
+          </a:prstGeom>
+        </p:spPr>
+        <p:style>
+          <a:lnRef idx="2">
+            <a:schemeClr val="accent1"/>
+          </a:lnRef>
+          <a:fillRef idx="0">
+            <a:schemeClr val="accent1"/>
+          </a:fillRef>
+          <a:effectRef idx="1">
+            <a:schemeClr val="accent1"/>
+          </a:effectRef>
+          <a:fontRef idx="minor">
+            <a:schemeClr val="tx1"/>
+          </a:fontRef>
+        </p:style>
+      </p:cxnSp>
+      <p:cxnSp>
+        <p:nvCxnSpPr>
+          <p:cNvPr id="15" name="Straight Connector 14"/>
+          <p:cNvCxnSpPr/>
+          <p:nvPr/>
+        </p:nvCxnSpPr>
+        <p:spPr>
+          <a:xfrm>
+            <a:off x="1619539" y="1224121"/>
+            <a:ext cx="0" cy="483117"/>
+          </a:xfrm>
+          <a:prstGeom prst="line">
+            <a:avLst/>
+          </a:prstGeom>
+        </p:spPr>
+        <p:style>
+          <a:lnRef idx="2">
+            <a:schemeClr val="accent1"/>
+          </a:lnRef>
+          <a:fillRef idx="0">
+            <a:schemeClr val="accent1"/>
+          </a:fillRef>
+          <a:effectRef idx="1">
+            <a:schemeClr val="accent1"/>
+          </a:effectRef>
+          <a:fontRef idx="minor">
+            <a:schemeClr val="tx1"/>
+          </a:fontRef>
+        </p:style>
+      </p:cxnSp>
+      <p:cxnSp>
+        <p:nvCxnSpPr>
+          <p:cNvPr id="16" name="Straight Connector 15"/>
+          <p:cNvCxnSpPr/>
+          <p:nvPr/>
+        </p:nvCxnSpPr>
+        <p:spPr>
+          <a:xfrm>
+            <a:off x="1227440" y="1707238"/>
+            <a:ext cx="392099" cy="0"/>
+          </a:xfrm>
+          <a:prstGeom prst="line">
+            <a:avLst/>
+          </a:prstGeom>
+        </p:spPr>
+        <p:style>
+          <a:lnRef idx="2">
+            <a:schemeClr val="accent1"/>
+          </a:lnRef>
+          <a:fillRef idx="0">
+            <a:schemeClr val="accent1"/>
+          </a:fillRef>
+          <a:effectRef idx="1">
+            <a:schemeClr val="accent1"/>
+          </a:effectRef>
+          <a:fontRef idx="minor">
+            <a:schemeClr val="tx1"/>
+          </a:fontRef>
+        </p:style>
+      </p:cxnSp>
+      <p:sp>
+        <p:nvSpPr>
+          <p:cNvPr id="17" name="TextBox 16"/>
+          <p:cNvSpPr txBox="1"/>
+          <p:nvPr/>
+        </p:nvSpPr>
+        <p:spPr>
+          <a:xfrm>
+            <a:off x="5116556" y="957670"/>
+            <a:ext cx="3117519" cy="3713373"/>
+          </a:xfrm>
+          <a:prstGeom prst="rect">
+            <a:avLst/>
+          </a:prstGeom>
+          <a:solidFill>
+            <a:schemeClr val="bg1"/>
+          </a:solidFill>
+          <a:ln>
+            <a:solidFill>
+              <a:schemeClr val="tx1">
+                <a:lumMod val="50000"/>
+                <a:lumOff val="50000"/>
+              </a:schemeClr>
+            </a:solidFill>
+          </a:ln>
+          <a:effectLst>
+            <a:outerShdw blurRad="50800" dist="38100" dir="8100000" algn="tr" rotWithShape="0">
+              <a:prstClr val="black">
+                <a:alpha val="40000"/>
+              </a:prstClr>
+            </a:outerShdw>
+          </a:effectLst>
+        </p:spPr>
+        <p:txBody>
+          <a:bodyPr wrap="square" lIns="0" tIns="0" rIns="0" bIns="0" rtlCol="0">
+            <a:normAutofit/>
+          </a:bodyPr>
+          <a:lstStyle/>
+          <a:p>
+            <a:pPr marL="230188"/>
+            <a:r>
+              <a:rPr lang="en-US" sz="800" dirty="0">
+                <a:solidFill>
+                  <a:schemeClr val="tx2"/>
+                </a:solidFill>
+                <a:effectLst>
+                  <a:outerShdw blurRad="38100" dist="25400" dir="2700000" algn="tl">
+                    <a:srgbClr val="000000">
+                      <a:alpha val="0"/>
+                    </a:srgbClr>
+                  </a:outerShdw>
+                </a:effectLst>
+                <a:latin typeface="Consolas"/>
+                <a:cs typeface="Consolas"/>
+              </a:rPr>
+              <a:t>title</a:t>
+            </a:r>
+          </a:p>
+          <a:p>
+            <a:pPr marL="230188"/>
+            <a:r>
+              <a:rPr lang="en-US" sz="800" dirty="0">
+                <a:solidFill>
+                  <a:schemeClr val="tx2"/>
+                </a:solidFill>
+                <a:effectLst>
+                  <a:outerShdw blurRad="38100" dist="25400" dir="2700000" algn="tl">
+                    <a:srgbClr val="000000">
+                      <a:alpha val="0"/>
+                    </a:srgbClr>
+                  </a:outerShdw>
+                </a:effectLst>
+                <a:latin typeface="Consolas"/>
+                <a:cs typeface="Consolas"/>
+              </a:rPr>
+              <a:t>=====</a:t>
+            </a:r>
+          </a:p>
+          <a:p>
+            <a:pPr marL="230188"/>
+            <a:endParaRPr lang="en-US" sz="800" dirty="0">
+              <a:solidFill>
+                <a:schemeClr val="tx2"/>
+              </a:solidFill>
+              <a:effectLst>
+                <a:outerShdw blurRad="38100" dist="25400" dir="2700000" algn="tl">
+                  <a:srgbClr val="000000">
+                    <a:alpha val="0"/>
+                  </a:srgbClr>
+                </a:outerShdw>
+              </a:effectLst>
+              <a:latin typeface="Consolas"/>
+              <a:cs typeface="Consolas"/>
+            </a:endParaRPr>
+          </a:p>
+          <a:p>
+            <a:pPr marL="230188"/>
+            <a:r>
+              <a:rPr lang="en-US" sz="800" dirty="0" smtClean="0">
+                <a:solidFill>
+                  <a:schemeClr val="tx2"/>
+                </a:solidFill>
+                <a:effectLst>
+                  <a:outerShdw blurRad="38100" dist="25400" dir="2700000" algn="tl">
+                    <a:srgbClr val="000000">
+                      <a:alpha val="0"/>
+                    </a:srgbClr>
+                  </a:outerShdw>
+                </a:effectLst>
+                <a:latin typeface="Consolas"/>
+                <a:cs typeface="Consolas"/>
+              </a:rPr>
+              <a:t>.. include:: includes/</a:t>
+            </a:r>
+            <a:r>
+              <a:rPr lang="en-US" sz="800" dirty="0" err="1" smtClean="0">
+                <a:solidFill>
+                  <a:schemeClr val="tx2"/>
+                </a:solidFill>
+                <a:effectLst>
+                  <a:outerShdw blurRad="38100" dist="25400" dir="2700000" algn="tl">
+                    <a:srgbClr val="000000">
+                      <a:alpha val="0"/>
+                    </a:srgbClr>
+                  </a:outerShdw>
+                </a:effectLst>
+                <a:latin typeface="Consolas"/>
+                <a:cs typeface="Consolas"/>
+              </a:rPr>
+              <a:t>concept_overview.rst</a:t>
+            </a:r>
+            <a:endParaRPr lang="en-US" sz="800" dirty="0">
+              <a:solidFill>
+                <a:schemeClr val="tx2"/>
+              </a:solidFill>
+              <a:effectLst>
+                <a:outerShdw blurRad="38100" dist="25400" dir="2700000" algn="tl">
+                  <a:srgbClr val="000000">
+                    <a:alpha val="0"/>
+                  </a:srgbClr>
+                </a:outerShdw>
+              </a:effectLst>
+              <a:latin typeface="Consolas"/>
+              <a:cs typeface="Consolas"/>
+            </a:endParaRPr>
+          </a:p>
+          <a:p>
+            <a:pPr marL="230188"/>
+            <a:endParaRPr lang="en-US" sz="800" dirty="0" smtClean="0">
+              <a:solidFill>
+                <a:schemeClr val="tx2"/>
+              </a:solidFill>
+              <a:effectLst>
+                <a:outerShdw blurRad="38100" dist="25400" dir="2700000" algn="tl">
+                  <a:srgbClr val="000000">
+                    <a:alpha val="0"/>
+                  </a:srgbClr>
+                </a:outerShdw>
+              </a:effectLst>
+              <a:latin typeface="Consolas"/>
+              <a:cs typeface="Consolas"/>
+            </a:endParaRPr>
+          </a:p>
+          <a:p>
+            <a:pPr marL="230188"/>
+            <a:r>
+              <a:rPr lang="en-US" sz="800" dirty="0" smtClean="0">
+                <a:solidFill>
+                  <a:schemeClr val="tx2"/>
+                </a:solidFill>
+                <a:effectLst>
+                  <a:outerShdw blurRad="38100" dist="25400" dir="2700000" algn="tl">
+                    <a:srgbClr val="000000">
+                      <a:alpha val="0"/>
+                    </a:srgbClr>
+                  </a:outerShdw>
+                </a:effectLst>
+                <a:latin typeface="Consolas"/>
+                <a:cs typeface="Consolas"/>
+              </a:rPr>
+              <a:t>.. include:: includes/</a:t>
+            </a:r>
+            <a:r>
+              <a:rPr lang="en-US" sz="800" dirty="0" err="1" smtClean="0">
+                <a:solidFill>
+                  <a:schemeClr val="tx2"/>
+                </a:solidFill>
+                <a:effectLst>
+                  <a:outerShdw blurRad="38100" dist="25400" dir="2700000" algn="tl">
+                    <a:srgbClr val="000000">
+                      <a:alpha val="0"/>
+                    </a:srgbClr>
+                  </a:outerShdw>
+                </a:effectLst>
+                <a:latin typeface="Consolas"/>
+                <a:cs typeface="Consolas"/>
+              </a:rPr>
+              <a:t>concept_use-case.rst</a:t>
+            </a:r>
+            <a:endParaRPr lang="en-US" sz="800" dirty="0" smtClean="0">
+              <a:solidFill>
+                <a:schemeClr val="tx2"/>
+              </a:solidFill>
+              <a:effectLst>
+                <a:outerShdw blurRad="38100" dist="25400" dir="2700000" algn="tl">
+                  <a:srgbClr val="000000">
+                    <a:alpha val="0"/>
+                  </a:srgbClr>
+                </a:outerShdw>
+              </a:effectLst>
+              <a:latin typeface="Consolas"/>
+              <a:cs typeface="Consolas"/>
+            </a:endParaRPr>
+          </a:p>
+          <a:p>
+            <a:pPr marL="230188"/>
+            <a:endParaRPr lang="en-US" sz="800" dirty="0">
+              <a:solidFill>
+                <a:schemeClr val="tx2"/>
+              </a:solidFill>
+              <a:effectLst>
+                <a:outerShdw blurRad="38100" dist="25400" dir="2700000" algn="tl">
+                  <a:srgbClr val="000000">
+                    <a:alpha val="0"/>
+                  </a:srgbClr>
+                </a:outerShdw>
+              </a:effectLst>
+              <a:latin typeface="Consolas"/>
+              <a:cs typeface="Consolas"/>
+            </a:endParaRPr>
+          </a:p>
+          <a:p>
+            <a:pPr marL="230188"/>
+            <a:r>
+              <a:rPr lang="en-US" sz="800" dirty="0" smtClean="0">
+                <a:solidFill>
+                  <a:schemeClr val="tx2"/>
+                </a:solidFill>
+                <a:effectLst>
+                  <a:outerShdw blurRad="38100" dist="25400" dir="2700000" algn="tl">
+                    <a:srgbClr val="000000">
+                      <a:alpha val="0"/>
+                    </a:srgbClr>
+                  </a:outerShdw>
+                </a:effectLst>
+                <a:latin typeface="Consolas"/>
+                <a:cs typeface="Consolas"/>
+              </a:rPr>
+              <a:t>.. include:: includes/</a:t>
+            </a:r>
+            <a:r>
+              <a:rPr lang="en-US" sz="800" dirty="0" err="1" smtClean="0">
+                <a:solidFill>
+                  <a:schemeClr val="tx2"/>
+                </a:solidFill>
+                <a:effectLst>
+                  <a:outerShdw blurRad="38100" dist="25400" dir="2700000" algn="tl">
+                    <a:srgbClr val="000000">
+                      <a:alpha val="0"/>
+                    </a:srgbClr>
+                  </a:outerShdw>
+                </a:effectLst>
+                <a:latin typeface="Consolas"/>
+                <a:cs typeface="Consolas"/>
+              </a:rPr>
+              <a:t>ref_prerequisites</a:t>
+            </a:r>
+            <a:r>
+              <a:rPr lang="en-US" sz="800" dirty="0" err="1" smtClean="0">
+                <a:solidFill>
+                  <a:schemeClr val="tx2"/>
+                </a:solidFill>
+                <a:effectLst>
+                  <a:outerShdw blurRad="38100" dist="25400" dir="2700000" algn="tl">
+                    <a:srgbClr val="000000">
+                      <a:alpha val="0"/>
+                    </a:srgbClr>
+                  </a:outerShdw>
+                </a:effectLst>
+                <a:latin typeface="Consolas"/>
+                <a:cs typeface="Consolas"/>
+              </a:rPr>
+              <a:t>.rst</a:t>
+            </a:r>
+            <a:endParaRPr lang="en-US" sz="800" dirty="0" smtClean="0">
+              <a:solidFill>
+                <a:schemeClr val="tx2"/>
+              </a:solidFill>
+              <a:effectLst>
+                <a:outerShdw blurRad="38100" dist="25400" dir="2700000" algn="tl">
+                  <a:srgbClr val="000000">
+                    <a:alpha val="0"/>
+                  </a:srgbClr>
+                </a:outerShdw>
+              </a:effectLst>
+              <a:latin typeface="Consolas"/>
+              <a:cs typeface="Consolas"/>
+            </a:endParaRPr>
+          </a:p>
+          <a:p>
+            <a:pPr marL="230188"/>
+            <a:endParaRPr lang="en-US" sz="800" dirty="0">
+              <a:solidFill>
+                <a:schemeClr val="tx2"/>
+              </a:solidFill>
+              <a:effectLst>
+                <a:outerShdw blurRad="38100" dist="25400" dir="2700000" algn="tl">
+                  <a:srgbClr val="000000">
+                    <a:alpha val="0"/>
+                  </a:srgbClr>
+                </a:outerShdw>
+              </a:effectLst>
+              <a:latin typeface="Consolas"/>
+              <a:cs typeface="Consolas"/>
+            </a:endParaRPr>
+          </a:p>
+          <a:p>
+            <a:pPr marL="230188"/>
+            <a:r>
+              <a:rPr lang="en-US" sz="800" dirty="0" smtClean="0">
+                <a:solidFill>
+                  <a:schemeClr val="tx2"/>
+                </a:solidFill>
+                <a:effectLst>
+                  <a:outerShdw blurRad="38100" dist="25400" dir="2700000" algn="tl">
+                    <a:srgbClr val="000000">
+                      <a:alpha val="0"/>
+                    </a:srgbClr>
+                  </a:outerShdw>
+                </a:effectLst>
+                <a:latin typeface="Consolas"/>
+                <a:cs typeface="Consolas"/>
+              </a:rPr>
+              <a:t>.. include:: includes/</a:t>
+            </a:r>
+            <a:r>
+              <a:rPr lang="en-US" sz="800" dirty="0" err="1" smtClean="0">
+                <a:solidFill>
+                  <a:schemeClr val="tx2"/>
+                </a:solidFill>
+                <a:effectLst>
+                  <a:outerShdw blurRad="38100" dist="25400" dir="2700000" algn="tl">
+                    <a:srgbClr val="000000">
+                      <a:alpha val="0"/>
+                    </a:srgbClr>
+                  </a:outerShdw>
+                </a:effectLst>
+                <a:latin typeface="Consolas"/>
+                <a:cs typeface="Consolas"/>
+              </a:rPr>
+              <a:t>concept_caveats.rst</a:t>
+            </a:r>
+            <a:endParaRPr lang="en-US" sz="800" dirty="0" smtClean="0">
+              <a:solidFill>
+                <a:schemeClr val="tx2"/>
+              </a:solidFill>
+              <a:effectLst>
+                <a:outerShdw blurRad="38100" dist="25400" dir="2700000" algn="tl">
+                  <a:srgbClr val="000000">
+                    <a:alpha val="0"/>
+                  </a:srgbClr>
+                </a:outerShdw>
+              </a:effectLst>
+              <a:latin typeface="Consolas"/>
+              <a:cs typeface="Consolas"/>
+            </a:endParaRPr>
+          </a:p>
+          <a:p>
+            <a:pPr marL="230188"/>
+            <a:endParaRPr lang="en-US" sz="800" dirty="0">
+              <a:solidFill>
+                <a:schemeClr val="tx2"/>
+              </a:solidFill>
+              <a:effectLst>
+                <a:outerShdw blurRad="38100" dist="25400" dir="2700000" algn="tl">
+                  <a:srgbClr val="000000">
+                    <a:alpha val="0"/>
+                  </a:srgbClr>
+                </a:outerShdw>
+              </a:effectLst>
+              <a:latin typeface="Consolas"/>
+              <a:cs typeface="Consolas"/>
+            </a:endParaRPr>
+          </a:p>
+          <a:p>
+            <a:pPr marL="230188"/>
+            <a:endParaRPr lang="en-US" sz="800" dirty="0">
+              <a:solidFill>
+                <a:schemeClr val="tx2"/>
+              </a:solidFill>
+              <a:effectLst>
+                <a:outerShdw blurRad="38100" dist="25400" dir="2700000" algn="tl">
+                  <a:srgbClr val="000000">
+                    <a:alpha val="0"/>
+                  </a:srgbClr>
+                </a:outerShdw>
+              </a:effectLst>
+              <a:latin typeface="Consolas"/>
+              <a:cs typeface="Consolas"/>
+            </a:endParaRPr>
+          </a:p>
+          <a:p>
+            <a:pPr marL="230188"/>
+            <a:r>
+              <a:rPr lang="en-US" sz="800" dirty="0">
+                <a:solidFill>
+                  <a:schemeClr val="tx2"/>
+                </a:solidFill>
+                <a:effectLst>
+                  <a:outerShdw blurRad="38100" dist="25400" dir="2700000" algn="tl">
+                    <a:srgbClr val="000000">
+                      <a:alpha val="0"/>
+                    </a:srgbClr>
+                  </a:outerShdw>
+                </a:effectLst>
+                <a:latin typeface="Consolas"/>
+                <a:cs typeface="Consolas"/>
+              </a:rPr>
+              <a:t>Configuration</a:t>
+            </a:r>
+          </a:p>
+          <a:p>
+            <a:pPr marL="230188"/>
+            <a:r>
+              <a:rPr lang="en-US" sz="800" dirty="0">
+                <a:solidFill>
+                  <a:schemeClr val="tx2"/>
+                </a:solidFill>
+                <a:effectLst>
+                  <a:outerShdw blurRad="38100" dist="25400" dir="2700000" algn="tl">
+                    <a:srgbClr val="000000">
+                      <a:alpha val="0"/>
+                    </a:srgbClr>
+                  </a:outerShdw>
+                </a:effectLst>
+                <a:latin typeface="Consolas"/>
+                <a:cs typeface="Consolas"/>
+              </a:rPr>
+              <a:t>-------------</a:t>
+            </a:r>
+          </a:p>
+          <a:p>
+            <a:pPr marL="230188"/>
+            <a:endParaRPr lang="en-US" sz="800" dirty="0" smtClean="0">
+              <a:solidFill>
+                <a:schemeClr val="tx2"/>
+              </a:solidFill>
+              <a:effectLst>
+                <a:outerShdw blurRad="38100" dist="25400" dir="2700000" algn="tl">
+                  <a:srgbClr val="000000">
+                    <a:alpha val="0"/>
+                  </a:srgbClr>
+                </a:outerShdw>
+              </a:effectLst>
+              <a:latin typeface="Consolas"/>
+              <a:cs typeface="Consolas"/>
+            </a:endParaRPr>
+          </a:p>
+          <a:p>
+            <a:pPr marL="230188"/>
+            <a:r>
+              <a:rPr lang="en-US" sz="800" dirty="0" smtClean="0">
+                <a:solidFill>
+                  <a:schemeClr val="tx2"/>
+                </a:solidFill>
+                <a:effectLst>
+                  <a:outerShdw blurRad="38100" dist="25400" dir="2700000" algn="tl">
+                    <a:srgbClr val="000000">
+                      <a:alpha val="0"/>
+                    </a:srgbClr>
+                  </a:outerShdw>
+                </a:effectLst>
+                <a:latin typeface="Consolas"/>
+                <a:cs typeface="Consolas"/>
+              </a:rPr>
+              <a:t>.. include:: includes/</a:t>
+            </a:r>
+            <a:r>
+              <a:rPr lang="en-US" sz="800" dirty="0" err="1" smtClean="0">
+                <a:solidFill>
+                  <a:schemeClr val="tx2"/>
+                </a:solidFill>
+                <a:effectLst>
+                  <a:outerShdw blurRad="38100" dist="25400" dir="2700000" algn="tl">
+                    <a:srgbClr val="000000">
+                      <a:alpha val="0"/>
+                    </a:srgbClr>
+                  </a:outerShdw>
+                </a:effectLst>
+                <a:latin typeface="Consolas"/>
+                <a:cs typeface="Consolas"/>
+              </a:rPr>
+              <a:t>topic_how</a:t>
+            </a:r>
+            <a:r>
+              <a:rPr lang="en-US" sz="800" dirty="0" smtClean="0">
+                <a:solidFill>
+                  <a:schemeClr val="tx2"/>
+                </a:solidFill>
+                <a:effectLst>
+                  <a:outerShdw blurRad="38100" dist="25400" dir="2700000" algn="tl">
+                    <a:srgbClr val="000000">
+                      <a:alpha val="0"/>
+                    </a:srgbClr>
+                  </a:outerShdw>
+                </a:effectLst>
+                <a:latin typeface="Consolas"/>
+                <a:cs typeface="Consolas"/>
+              </a:rPr>
+              <a:t>-to-</a:t>
+            </a:r>
+            <a:r>
+              <a:rPr lang="en-US" sz="800" dirty="0" err="1" smtClean="0">
+                <a:solidFill>
+                  <a:schemeClr val="tx2"/>
+                </a:solidFill>
+                <a:effectLst>
+                  <a:outerShdw blurRad="38100" dist="25400" dir="2700000" algn="tl">
+                    <a:srgbClr val="000000">
+                      <a:alpha val="0"/>
+                    </a:srgbClr>
+                  </a:outerShdw>
+                </a:effectLst>
+                <a:latin typeface="Consolas"/>
+                <a:cs typeface="Consolas"/>
+              </a:rPr>
+              <a:t>configure.rst</a:t>
+            </a:r>
+            <a:endParaRPr lang="en-US" sz="800" dirty="0">
+              <a:solidFill>
+                <a:schemeClr val="tx2"/>
+              </a:solidFill>
+              <a:effectLst>
+                <a:outerShdw blurRad="38100" dist="25400" dir="2700000" algn="tl">
+                  <a:srgbClr val="000000">
+                    <a:alpha val="0"/>
+                  </a:srgbClr>
+                </a:outerShdw>
+              </a:effectLst>
+              <a:latin typeface="Consolas"/>
+              <a:cs typeface="Consolas"/>
+            </a:endParaRPr>
+          </a:p>
+          <a:p>
+            <a:pPr marL="230188"/>
+            <a:endParaRPr lang="en-US" sz="800" dirty="0">
+              <a:solidFill>
+                <a:schemeClr val="tx2"/>
+              </a:solidFill>
+              <a:effectLst>
+                <a:outerShdw blurRad="38100" dist="25400" dir="2700000" algn="tl">
+                  <a:srgbClr val="000000">
+                    <a:alpha val="0"/>
+                  </a:srgbClr>
+                </a:outerShdw>
+              </a:effectLst>
+              <a:latin typeface="Consolas"/>
+              <a:cs typeface="Consolas"/>
+            </a:endParaRPr>
+          </a:p>
+          <a:p>
+            <a:pPr marL="230188"/>
+            <a:r>
+              <a:rPr lang="en-US" sz="800" dirty="0">
+                <a:solidFill>
+                  <a:schemeClr val="tx2"/>
+                </a:solidFill>
+                <a:effectLst>
+                  <a:outerShdw blurRad="38100" dist="25400" dir="2700000" algn="tl">
+                    <a:srgbClr val="000000">
+                      <a:alpha val="0"/>
+                    </a:srgbClr>
+                  </a:outerShdw>
+                </a:effectLst>
+                <a:latin typeface="Consolas"/>
+                <a:cs typeface="Consolas"/>
+              </a:rPr>
+              <a:t>Further Reading</a:t>
+            </a:r>
+          </a:p>
+          <a:p>
+            <a:pPr marL="230188"/>
+            <a:r>
+              <a:rPr lang="en-US" sz="800" dirty="0">
+                <a:solidFill>
+                  <a:schemeClr val="tx2"/>
+                </a:solidFill>
+                <a:effectLst>
+                  <a:outerShdw blurRad="38100" dist="25400" dir="2700000" algn="tl">
+                    <a:srgbClr val="000000">
+                      <a:alpha val="0"/>
+                    </a:srgbClr>
+                  </a:outerShdw>
+                </a:effectLst>
+                <a:latin typeface="Consolas"/>
+                <a:cs typeface="Consolas"/>
+              </a:rPr>
+              <a:t>---------------</a:t>
+            </a:r>
+          </a:p>
+          <a:p>
+            <a:pPr marL="230188"/>
+            <a:endParaRPr lang="en-US" sz="800" dirty="0" smtClean="0">
+              <a:solidFill>
+                <a:schemeClr val="tx2"/>
+              </a:solidFill>
+              <a:effectLst>
+                <a:outerShdw blurRad="38100" dist="25400" dir="2700000" algn="tl">
+                  <a:srgbClr val="000000">
+                    <a:alpha val="0"/>
+                  </a:srgbClr>
+                </a:outerShdw>
+              </a:effectLst>
+              <a:latin typeface="Consolas"/>
+              <a:cs typeface="Consolas"/>
+            </a:endParaRPr>
+          </a:p>
+          <a:p>
+            <a:pPr marL="230188"/>
+            <a:r>
+              <a:rPr lang="en-US" sz="800" dirty="0" smtClean="0">
+                <a:solidFill>
+                  <a:schemeClr val="tx2"/>
+                </a:solidFill>
+                <a:effectLst>
+                  <a:outerShdw blurRad="38100" dist="25400" dir="2700000" algn="tl">
+                    <a:srgbClr val="000000">
+                      <a:alpha val="0"/>
+                    </a:srgbClr>
+                  </a:outerShdw>
+                </a:effectLst>
+                <a:latin typeface="Consolas"/>
+                <a:cs typeface="Consolas"/>
+              </a:rPr>
+              <a:t>.. include:: includes/</a:t>
+            </a:r>
+            <a:r>
+              <a:rPr lang="en-US" sz="800" dirty="0" err="1" smtClean="0">
+                <a:solidFill>
+                  <a:schemeClr val="tx2"/>
+                </a:solidFill>
+                <a:effectLst>
+                  <a:outerShdw blurRad="38100" dist="25400" dir="2700000" algn="tl">
+                    <a:srgbClr val="000000">
+                      <a:alpha val="0"/>
+                    </a:srgbClr>
+                  </a:outerShdw>
+                </a:effectLst>
+                <a:latin typeface="Consolas"/>
+                <a:cs typeface="Consolas"/>
+              </a:rPr>
+              <a:t>ref_further-reading.rst</a:t>
+            </a:r>
+            <a:endParaRPr lang="en-US" sz="800" dirty="0">
+              <a:solidFill>
+                <a:schemeClr val="tx2"/>
+              </a:solidFill>
+              <a:effectLst>
+                <a:outerShdw blurRad="38100" dist="25400" dir="2700000" algn="tl">
+                  <a:srgbClr val="000000">
+                    <a:alpha val="0"/>
+                  </a:srgbClr>
+                </a:outerShdw>
+              </a:effectLst>
+              <a:latin typeface="Consolas"/>
+              <a:cs typeface="Consolas"/>
+            </a:endParaRPr>
+          </a:p>
+        </p:txBody>
+      </p:sp>
+      <p:sp>
+        <p:nvSpPr>
+          <p:cNvPr id="19" name="Right Arrow 18"/>
+          <p:cNvSpPr/>
+          <p:nvPr/>
+        </p:nvSpPr>
+        <p:spPr>
+          <a:xfrm>
+            <a:off x="1739154" y="2004525"/>
+            <a:ext cx="1837831" cy="287093"/>
+          </a:xfrm>
+          <a:prstGeom prst="rightArrow">
+            <a:avLst/>
+          </a:prstGeom>
+          <a:solidFill>
+            <a:schemeClr val="accent1">
+              <a:lumMod val="75000"/>
+            </a:schemeClr>
+          </a:solidFill>
+        </p:spPr>
+        <p:txBody>
+          <a:bodyPr vert="horz" wrap="square" lIns="182880" tIns="0" rIns="91440" bIns="0" rtlCol="0" anchor="ctr">
+            <a:noAutofit/>
+          </a:bodyPr>
+          <a:lstStyle/>
+          <a:p>
+            <a:pPr indent="0" algn="ctr">
+              <a:lnSpc>
+                <a:spcPct val="90000"/>
+              </a:lnSpc>
+              <a:spcBef>
+                <a:spcPts val="0"/>
+              </a:spcBef>
+              <a:spcAft>
+                <a:spcPts val="0"/>
+              </a:spcAft>
+              <a:buClrTx/>
+              <a:buFont typeface="Arial" pitchFamily="34" charset="0"/>
+              <a:buNone/>
+            </a:pPr>
+            <a:endParaRPr lang="en-US" sz="2000" b="0" i="0" cap="all" baseline="0">
+              <a:solidFill>
+                <a:schemeClr val="bg1"/>
+              </a:solidFill>
+              <a:effectLst>
+                <a:outerShdw blurRad="38100" dist="25400" dir="2700000" algn="tl">
+                  <a:srgbClr val="000000">
+                    <a:alpha val="0"/>
+                  </a:srgbClr>
+                </a:outerShdw>
+              </a:effectLst>
+              <a:latin typeface="+mj-lt"/>
+            </a:endParaRPr>
+          </a:p>
+        </p:txBody>
+      </p:sp>
+      <p:sp>
+        <p:nvSpPr>
+          <p:cNvPr id="20" name="TextBox 19"/>
+          <p:cNvSpPr txBox="1"/>
+          <p:nvPr/>
+        </p:nvSpPr>
+        <p:spPr>
+          <a:xfrm>
+            <a:off x="3696320" y="1994661"/>
+            <a:ext cx="914400" cy="306820"/>
+          </a:xfrm>
+          <a:prstGeom prst="rect">
+            <a:avLst/>
+          </a:prstGeom>
+          <a:noFill/>
+        </p:spPr>
+        <p:txBody>
+          <a:bodyPr wrap="none" lIns="0" tIns="0" rIns="0" bIns="0" rtlCol="0">
+            <a:noAutofit/>
+          </a:bodyPr>
+          <a:lstStyle/>
+          <a:p>
+            <a:pPr>
+              <a:lnSpc>
+                <a:spcPct val="90000"/>
+              </a:lnSpc>
+              <a:spcAft>
+                <a:spcPts val="600"/>
+              </a:spcAft>
+            </a:pPr>
+            <a:r>
+              <a:rPr lang="en-US" sz="2000" b="1" kern="1200" dirty="0" smtClean="0">
+                <a:solidFill>
+                  <a:schemeClr val="tx2"/>
+                </a:solidFill>
+                <a:effectLst>
+                  <a:outerShdw blurRad="38100" dist="25400" dir="2700000" algn="tl">
+                    <a:srgbClr val="000000">
+                      <a:alpha val="0"/>
+                    </a:srgbClr>
+                  </a:outerShdw>
+                </a:effectLst>
+                <a:latin typeface="+mn-lt"/>
+                <a:ea typeface="+mn-ea"/>
+                <a:cs typeface="+mn-cs"/>
+              </a:rPr>
+              <a:t>reference</a:t>
+            </a:r>
+            <a:endParaRPr lang="en-US" sz="2000" b="1" kern="1200" dirty="0" smtClean="0">
+              <a:solidFill>
+                <a:schemeClr val="tx2"/>
+              </a:solidFill>
+              <a:effectLst>
+                <a:outerShdw blurRad="38100" dist="25400" dir="2700000" algn="tl">
+                  <a:srgbClr val="000000">
+                    <a:alpha val="0"/>
+                  </a:srgbClr>
+                </a:outerShdw>
+              </a:effectLst>
+              <a:latin typeface="+mn-lt"/>
+              <a:ea typeface="+mn-ea"/>
+              <a:cs typeface="+mn-cs"/>
+            </a:endParaRPr>
+          </a:p>
+        </p:txBody>
+      </p:sp>
+      <p:cxnSp>
+        <p:nvCxnSpPr>
+          <p:cNvPr id="21" name="Straight Connector 20"/>
+          <p:cNvCxnSpPr/>
+          <p:nvPr/>
+        </p:nvCxnSpPr>
+        <p:spPr>
+          <a:xfrm>
+            <a:off x="1440537" y="1895069"/>
+            <a:ext cx="179002" cy="0"/>
+          </a:xfrm>
+          <a:prstGeom prst="line">
+            <a:avLst/>
+          </a:prstGeom>
+        </p:spPr>
+        <p:style>
+          <a:lnRef idx="2">
+            <a:schemeClr val="accent1"/>
+          </a:lnRef>
+          <a:fillRef idx="0">
+            <a:schemeClr val="accent1"/>
+          </a:fillRef>
+          <a:effectRef idx="1">
+            <a:schemeClr val="accent1"/>
+          </a:effectRef>
+          <a:fontRef idx="minor">
+            <a:schemeClr val="tx1"/>
+          </a:fontRef>
+        </p:style>
+      </p:cxnSp>
+      <p:cxnSp>
+        <p:nvCxnSpPr>
+          <p:cNvPr id="22" name="Straight Connector 21"/>
+          <p:cNvCxnSpPr/>
+          <p:nvPr/>
+        </p:nvCxnSpPr>
+        <p:spPr>
+          <a:xfrm>
+            <a:off x="1619539" y="1904933"/>
+            <a:ext cx="0" cy="483117"/>
+          </a:xfrm>
+          <a:prstGeom prst="line">
+            <a:avLst/>
+          </a:prstGeom>
+        </p:spPr>
+        <p:style>
+          <a:lnRef idx="2">
+            <a:schemeClr val="accent1"/>
+          </a:lnRef>
+          <a:fillRef idx="0">
+            <a:schemeClr val="accent1"/>
+          </a:fillRef>
+          <a:effectRef idx="1">
+            <a:schemeClr val="accent1"/>
+          </a:effectRef>
+          <a:fontRef idx="minor">
+            <a:schemeClr val="tx1"/>
+          </a:fontRef>
+        </p:style>
+      </p:cxnSp>
+      <p:cxnSp>
+        <p:nvCxnSpPr>
+          <p:cNvPr id="23" name="Straight Connector 22"/>
+          <p:cNvCxnSpPr/>
+          <p:nvPr/>
+        </p:nvCxnSpPr>
+        <p:spPr>
+          <a:xfrm>
+            <a:off x="1440537" y="2388050"/>
+            <a:ext cx="179002" cy="0"/>
+          </a:xfrm>
+          <a:prstGeom prst="line">
+            <a:avLst/>
+          </a:prstGeom>
+        </p:spPr>
+        <p:style>
+          <a:lnRef idx="2">
+            <a:schemeClr val="accent1"/>
+          </a:lnRef>
+          <a:fillRef idx="0">
+            <a:schemeClr val="accent1"/>
+          </a:fillRef>
+          <a:effectRef idx="1">
+            <a:schemeClr val="accent1"/>
+          </a:effectRef>
+          <a:fontRef idx="minor">
+            <a:schemeClr val="tx1"/>
+          </a:fontRef>
+        </p:style>
+      </p:cxnSp>
+      <p:cxnSp>
+        <p:nvCxnSpPr>
+          <p:cNvPr id="26" name="Straight Connector 25"/>
+          <p:cNvCxnSpPr/>
+          <p:nvPr/>
+        </p:nvCxnSpPr>
+        <p:spPr>
+          <a:xfrm>
+            <a:off x="1440537" y="3121340"/>
+            <a:ext cx="179002" cy="0"/>
+          </a:xfrm>
+          <a:prstGeom prst="line">
+            <a:avLst/>
+          </a:prstGeom>
+        </p:spPr>
+        <p:style>
+          <a:lnRef idx="2">
+            <a:schemeClr val="accent1"/>
+          </a:lnRef>
+          <a:fillRef idx="0">
+            <a:schemeClr val="accent1"/>
+          </a:fillRef>
+          <a:effectRef idx="1">
+            <a:schemeClr val="accent1"/>
+          </a:effectRef>
+          <a:fontRef idx="minor">
+            <a:schemeClr val="tx1"/>
+          </a:fontRef>
+        </p:style>
+      </p:cxnSp>
+      <p:cxnSp>
+        <p:nvCxnSpPr>
+          <p:cNvPr id="27" name="Straight Connector 26"/>
+          <p:cNvCxnSpPr/>
+          <p:nvPr/>
+        </p:nvCxnSpPr>
+        <p:spPr>
+          <a:xfrm>
+            <a:off x="1619539" y="3131204"/>
+            <a:ext cx="0" cy="483117"/>
+          </a:xfrm>
+          <a:prstGeom prst="line">
+            <a:avLst/>
+          </a:prstGeom>
+        </p:spPr>
+        <p:style>
+          <a:lnRef idx="2">
+            <a:schemeClr val="accent1"/>
+          </a:lnRef>
+          <a:fillRef idx="0">
+            <a:schemeClr val="accent1"/>
+          </a:fillRef>
+          <a:effectRef idx="1">
+            <a:schemeClr val="accent1"/>
+          </a:effectRef>
+          <a:fontRef idx="minor">
+            <a:schemeClr val="tx1"/>
+          </a:fontRef>
+        </p:style>
+      </p:cxnSp>
+      <p:cxnSp>
+        <p:nvCxnSpPr>
+          <p:cNvPr id="28" name="Straight Connector 27"/>
+          <p:cNvCxnSpPr/>
+          <p:nvPr/>
+        </p:nvCxnSpPr>
+        <p:spPr>
+          <a:xfrm>
+            <a:off x="1440537" y="3614321"/>
+            <a:ext cx="179002" cy="0"/>
+          </a:xfrm>
+          <a:prstGeom prst="line">
+            <a:avLst/>
+          </a:prstGeom>
+        </p:spPr>
+        <p:style>
+          <a:lnRef idx="2">
+            <a:schemeClr val="accent1"/>
+          </a:lnRef>
+          <a:fillRef idx="0">
+            <a:schemeClr val="accent1"/>
+          </a:fillRef>
+          <a:effectRef idx="1">
+            <a:schemeClr val="accent1"/>
+          </a:effectRef>
+          <a:fontRef idx="minor">
+            <a:schemeClr val="tx1"/>
+          </a:fontRef>
+        </p:style>
+      </p:cxnSp>
+      <p:sp>
+        <p:nvSpPr>
+          <p:cNvPr id="29" name="TextBox 28"/>
+          <p:cNvSpPr txBox="1"/>
+          <p:nvPr/>
+        </p:nvSpPr>
+        <p:spPr>
+          <a:xfrm>
+            <a:off x="1829588" y="4457416"/>
+            <a:ext cx="1747397" cy="332389"/>
+          </a:xfrm>
+          <a:prstGeom prst="rect">
+            <a:avLst/>
+          </a:prstGeom>
+          <a:solidFill>
+            <a:schemeClr val="bg1">
+              <a:lumMod val="75000"/>
+            </a:schemeClr>
+          </a:solidFill>
+          <a:effectLst>
+            <a:outerShdw blurRad="50800" dist="38100" dir="8100000" algn="tr" rotWithShape="0">
+              <a:prstClr val="black">
+                <a:alpha val="40000"/>
+              </a:prstClr>
+            </a:outerShdw>
+          </a:effectLst>
+        </p:spPr>
+        <p:txBody>
+          <a:bodyPr wrap="none" lIns="0" tIns="0" rIns="0" bIns="0" rtlCol="0" anchor="ctr">
+            <a:noAutofit/>
+          </a:bodyPr>
+          <a:lstStyle/>
+          <a:p>
+            <a:pPr algn="ctr">
+              <a:lnSpc>
+                <a:spcPct val="90000"/>
+              </a:lnSpc>
+              <a:spcAft>
+                <a:spcPts val="600"/>
+              </a:spcAft>
+            </a:pPr>
+            <a:r>
+              <a:rPr lang="en-US" sz="2000" kern="1200" dirty="0" smtClean="0">
+                <a:solidFill>
+                  <a:schemeClr val="tx2"/>
+                </a:solidFill>
+                <a:effectLst>
+                  <a:outerShdw blurRad="38100" dist="25400" dir="2700000" algn="tl">
+                    <a:srgbClr val="000000">
+                      <a:alpha val="0"/>
+                    </a:srgbClr>
+                  </a:outerShdw>
+                </a:effectLst>
+                <a:latin typeface="+mn-lt"/>
+                <a:ea typeface="+mn-ea"/>
+                <a:cs typeface="+mn-cs"/>
+              </a:rPr>
+              <a:t>Content Model</a:t>
+            </a:r>
+            <a:endParaRPr lang="en-US" sz="2000" kern="1200" dirty="0" smtClean="0">
+              <a:solidFill>
+                <a:schemeClr val="tx2"/>
+              </a:solidFill>
+              <a:effectLst>
+                <a:outerShdw blurRad="38100" dist="25400" dir="2700000" algn="tl">
+                  <a:srgbClr val="000000">
+                    <a:alpha val="0"/>
+                  </a:srgbClr>
+                </a:outerShdw>
+              </a:effectLst>
+              <a:latin typeface="+mn-lt"/>
+              <a:ea typeface="+mn-ea"/>
+              <a:cs typeface="+mn-cs"/>
+            </a:endParaRPr>
+          </a:p>
+        </p:txBody>
+      </p:sp>
+      <p:sp>
+        <p:nvSpPr>
+          <p:cNvPr id="30" name="TextBox 29"/>
+          <p:cNvSpPr txBox="1"/>
+          <p:nvPr/>
+        </p:nvSpPr>
+        <p:spPr>
+          <a:xfrm>
+            <a:off x="6729793" y="4457416"/>
+            <a:ext cx="1747397" cy="332389"/>
+          </a:xfrm>
+          <a:prstGeom prst="rect">
+            <a:avLst/>
+          </a:prstGeom>
+          <a:solidFill>
+            <a:schemeClr val="bg1">
+              <a:lumMod val="75000"/>
+            </a:schemeClr>
+          </a:solidFill>
+          <a:effectLst>
+            <a:outerShdw blurRad="50800" dist="38100" dir="8100000" algn="tr" rotWithShape="0">
+              <a:prstClr val="black">
+                <a:alpha val="40000"/>
+              </a:prstClr>
+            </a:outerShdw>
+          </a:effectLst>
+        </p:spPr>
+        <p:txBody>
+          <a:bodyPr wrap="none" lIns="0" tIns="0" rIns="0" bIns="0" rtlCol="0" anchor="ctr">
+            <a:noAutofit/>
+          </a:bodyPr>
+          <a:lstStyle/>
+          <a:p>
+            <a:pPr algn="ctr">
+              <a:lnSpc>
+                <a:spcPct val="90000"/>
+              </a:lnSpc>
+              <a:spcAft>
+                <a:spcPts val="600"/>
+              </a:spcAft>
+            </a:pPr>
+            <a:r>
+              <a:rPr lang="en-US" sz="2000" kern="1200" dirty="0" smtClean="0">
+                <a:solidFill>
+                  <a:schemeClr val="tx2"/>
+                </a:solidFill>
+                <a:effectLst>
+                  <a:outerShdw blurRad="38100" dist="25400" dir="2700000" algn="tl">
+                    <a:srgbClr val="000000">
+                      <a:alpha val="0"/>
+                    </a:srgbClr>
+                  </a:outerShdw>
+                </a:effectLst>
+                <a:latin typeface="+mn-lt"/>
+                <a:ea typeface="+mn-ea"/>
+                <a:cs typeface="+mn-cs"/>
+              </a:rPr>
+              <a:t>Map</a:t>
+            </a:r>
+            <a:endParaRPr lang="en-US" sz="2000" kern="1200" dirty="0" smtClean="0">
+              <a:solidFill>
+                <a:schemeClr val="tx2"/>
+              </a:solidFill>
+              <a:effectLst>
+                <a:outerShdw blurRad="38100" dist="25400" dir="2700000" algn="tl">
+                  <a:srgbClr val="000000">
+                    <a:alpha val="0"/>
+                  </a:srgbClr>
+                </a:outerShdw>
+              </a:effectLst>
+              <a:latin typeface="+mn-lt"/>
+              <a:ea typeface="+mn-ea"/>
+              <a:cs typeface="+mn-cs"/>
+            </a:endParaRPr>
+          </a:p>
+        </p:txBody>
+      </p:sp>
+    </p:spTree>
+    <p:extLst>
+      <p:ext uri="{BB962C8B-B14F-4D97-AF65-F5344CB8AC3E}">
+        <p14:creationId xmlns:p14="http://schemas.microsoft.com/office/powerpoint/2010/main" val="3341956402"/>
+      </p:ext>
+    </p:extLst>
+  </p:cSld>
+  <p:clrMapOvr>
+    <a:masterClrMapping/>
+  </p:clrMapOvr>
+</p:sld>
+</file>
+
+<file path=ppt/slides/slide11.xml><?xml version="1.0" encoding="utf-8"?>
+<p:sld xmlns:a="http://schemas.openxmlformats.org/drawingml/2006/main" xmlns:r="http://schemas.openxmlformats.org/officeDocument/2006/relationships" xmlns:p="http://schemas.openxmlformats.org/presentationml/2006/main">
+  <p:cSld>
+    <p:spTree>
+      <p:nvGrpSpPr>
+        <p:cNvPr id="1" name=""/>
+        <p:cNvGrpSpPr/>
+        <p:nvPr/>
+      </p:nvGrpSpPr>
+      <p:grpSpPr>
+        <a:xfrm>
+          <a:off x="0" y="0"/>
+          <a:ext cx="0" cy="0"/>
+          <a:chOff x="0" y="0"/>
+          <a:chExt cx="0" cy="0"/>
+        </a:xfrm>
+      </p:grpSpPr>
+      <p:sp>
+        <p:nvSpPr>
           <p:cNvPr id="3" name="Title 2"/>
           <p:cNvSpPr>
             <a:spLocks noGrp="1"/>
@@ -9476,7 +11756,7 @@
 </p:sld>
 </file>
 
-<file path=ppt/slides/slide11.xml><?xml version="1.0" encoding="utf-8"?>
+<file path=ppt/slides/slide12.xml><?xml version="1.0" encoding="utf-8"?>
 <p:sld xmlns:a="http://schemas.openxmlformats.org/drawingml/2006/main" xmlns:r="http://schemas.openxmlformats.org/officeDocument/2006/relationships" xmlns:p="http://schemas.openxmlformats.org/presentationml/2006/main">
   <p:cSld>
     <p:spTree>
@@ -10818,7 +13098,7 @@
           <a:p>
             <a:r>
               <a:rPr lang="en-US" dirty="0" smtClean="0"/>
-              <a:t>Topics and Content Reuse</a:t>
+              <a:t>Content Chunks and Reuse</a:t>
             </a:r>
             <a:endParaRPr lang="en-US" dirty="0"/>
           </a:p>
@@ -10895,8 +13175,13 @@
           <a:p>
             <a:r>
               <a:rPr lang="en-US" dirty="0"/>
-              <a:t>What is a topic?</a:t>
-            </a:r>
+              <a:t>What is a </a:t>
+            </a:r>
+            <a:r>
+              <a:rPr lang="en-US" dirty="0" smtClean="0"/>
+              <a:t>Content Chunk?</a:t>
+            </a:r>
+            <a:endParaRPr lang="en-US" dirty="0"/>
           </a:p>
         </p:txBody>
       </p:sp>
@@ -10921,14 +13206,12 @@
           <a:lstStyle/>
           <a:p>
             <a:r>
+              <a:rPr lang="en-US" dirty="0" smtClean="0"/>
+              <a:t>focuses </a:t>
+            </a:r>
+            <a:r>
               <a:rPr lang="en-US" dirty="0"/>
-              <a:t>modular chunk of content</a:t>
-            </a:r>
-          </a:p>
-          <a:p>
-            <a:r>
-              <a:rPr lang="en-US" dirty="0"/>
-              <a:t>focuses on a specific subject</a:t>
+              <a:t>on a specific subject</a:t>
             </a:r>
           </a:p>
           <a:p>
@@ -10973,7 +13256,7 @@
           <a:p>
             <a:r>
               <a:rPr lang="en-US" dirty="0" smtClean="0"/>
-              <a:t>Types of topics</a:t>
+              <a:t>Types of chunks</a:t>
             </a:r>
             <a:endParaRPr lang="en-US" dirty="0"/>
           </a:p>
@@ -11006,8 +13289,12 @@
           </a:p>
           <a:p>
             <a:r>
+              <a:rPr lang="en-US" dirty="0" smtClean="0"/>
+              <a:t>topic-</a:t>
+            </a:r>
+            <a:r>
               <a:rPr lang="en-US" dirty="0"/>
-              <a:t>task -- the ‘how’</a:t>
+              <a:t>- the ‘how’</a:t>
             </a:r>
           </a:p>
           <a:p>

</xml_diff>